<commit_message>
supression du figure 9.pptx
</commit_message>
<xml_diff>
--- a/Classification SOA.pptx
+++ b/Classification SOA.pptx
@@ -4842,32 +4842,25 @@
           </a:p>
         </p:txBody>
       </p:sp>
-      <p:pic>
-        <p:nvPicPr>
-          <p:cNvPr id="12" name="Content Placeholder 3"/>
-          <p:cNvPicPr>
-            <a:picLocks noGrp="1" noChangeAspect="1"/>
-          </p:cNvPicPr>
+      <p:sp>
+        <p:nvSpPr>
+          <p:cNvPr id="3" name="Espace réservé du contenu 2"/>
+          <p:cNvSpPr>
+            <a:spLocks noGrp="1"/>
+          </p:cNvSpPr>
           <p:nvPr>
             <p:ph idx="1"/>
           </p:nvPr>
-        </p:nvPicPr>
-        <p:blipFill>
-          <a:blip r:embed="rId3"/>
-          <a:stretch>
-            <a:fillRect/>
-          </a:stretch>
-        </p:blipFill>
-        <p:spPr>
-          <a:xfrm>
-            <a:off x="8741490" y="922679"/>
-            <a:ext cx="4330148" cy="2561420"/>
-          </a:xfrm>
-          <a:prstGeom prst="rect">
-            <a:avLst/>
-          </a:prstGeom>
-        </p:spPr>
-      </p:pic>
+        </p:nvSpPr>
+        <p:spPr/>
+        <p:txBody>
+          <a:bodyPr/>
+          <a:lstStyle/>
+          <a:p>
+            <a:endParaRPr lang="fr-FR"/>
+          </a:p>
+        </p:txBody>
+      </p:sp>
     </p:spTree>
     <p:extLst>
       <p:ext uri="{BB962C8B-B14F-4D97-AF65-F5344CB8AC3E}">

</xml_diff>